<commit_message>
Added PDF versions of slides
In response to #52 , I added the PDF versions of all of my slides and created links to them on the "Slides" page.
</commit_message>
<xml_diff>
--- a/lectures/030_datatypes_and_variables/Datatypes-Variables-Details.pptx
+++ b/lectures/030_datatypes_and_variables/Datatypes-Variables-Details.pptx
@@ -2611,7 +2611,7 @@
           <a:p>
             <a:fld id="{2507D560-C4D4-4804-8CBF-2C56AB6C6DB9}" type="datetimeFigureOut">
               <a:rPr lang="en-US" smtClean="0"/>
-              <a:t>5/25/2021</a:t>
+              <a:t>8/16/2021</a:t>
             </a:fld>
             <a:endParaRPr lang="en-US"/>
           </a:p>
@@ -2776,7 +2776,7 @@
           <a:p>
             <a:fld id="{688E7586-9A7B-41FF-B169-85DADA744493}" type="datetimeFigureOut">
               <a:rPr lang="en-US" smtClean="0"/>
-              <a:t>5/25/2021</a:t>
+              <a:t>8/16/2021</a:t>
             </a:fld>
             <a:endParaRPr lang="en-US"/>
           </a:p>
@@ -6400,8 +6400,8 @@
           </a:p>
           <a:p>
             <a:r>
-              <a:rPr lang="en-US" dirty="0"/>
-              <a:t>Spring </a:t>
+              <a:rPr lang="en-US" smtClean="0"/>
+              <a:t>Spring/Fall </a:t>
             </a:r>
             <a:r>
               <a:rPr lang="en-US" dirty="0" smtClean="0"/>

</xml_diff>